<commit_message>
ad afternoon header to microquiz11m-afternoon.pptx
</commit_message>
<xml_diff>
--- a/spring13/slides13/microquiz11m-afternoon.pptx
+++ b/spring13/slides13/microquiz11m-afternoon.pptx
@@ -3170,8 +3170,8 @@
         </p:nvSpPr>
         <p:spPr>
           <a:xfrm>
-            <a:off x="2301654" y="181450"/>
-            <a:ext cx="4556568" cy="741273"/>
+            <a:off x="1414701" y="181451"/>
+            <a:ext cx="6325807" cy="707916"/>
           </a:xfrm>
         </p:spPr>
         <p:txBody>
@@ -3197,7 +3197,7 @@
                   <a:srgbClr val="800000"/>
                 </a:solidFill>
               </a:rPr>
-              <a:t> </a:t>
+              <a:t> Apr. 22, </a:t>
             </a:r>
             <a:r>
               <a:rPr lang="en-US" dirty="0" smtClean="0">
@@ -3205,32 +3205,13 @@
                   <a:srgbClr val="800000"/>
                 </a:solidFill>
               </a:rPr>
-              <a:t>Apr</a:t>
-            </a:r>
-            <a:r>
-              <a:rPr lang="en-US" dirty="0" smtClean="0">
-                <a:solidFill>
-                  <a:srgbClr val="800000"/>
-                </a:solidFill>
-              </a:rPr>
-              <a:t>. </a:t>
-            </a:r>
-            <a:r>
-              <a:rPr lang="en-US" dirty="0" smtClean="0">
-                <a:solidFill>
-                  <a:srgbClr val="800000"/>
-                </a:solidFill>
-              </a:rPr>
-              <a:t>22, </a:t>
-            </a:r>
-            <a:r>
-              <a:rPr lang="en-US" dirty="0" smtClean="0">
-                <a:solidFill>
-                  <a:srgbClr val="800000"/>
-                </a:solidFill>
-              </a:rPr>
-              <a:t>2013</a:t>
-            </a:r>
+              <a:t>2013 -afternoon</a:t>
+            </a:r>
+            <a:endParaRPr lang="en-US" dirty="0" smtClean="0">
+              <a:solidFill>
+                <a:srgbClr val="800000"/>
+              </a:solidFill>
+            </a:endParaRPr>
           </a:p>
         </p:txBody>
       </p:sp>
@@ -3313,17 +3294,7 @@
                 <a:latin typeface="Comic Sans MS"/>
                 <a:cs typeface="Comic Sans MS"/>
               </a:rPr>
-              <a:t>w+x</a:t>
-            </a:r>
-            <a:r>
-              <a:rPr lang="en-US" sz="3600" dirty="0" err="1" smtClean="0">
-                <a:solidFill>
-                  <a:srgbClr val="0000FF"/>
-                </a:solidFill>
-                <a:latin typeface="Comic Sans MS"/>
-                <a:cs typeface="Comic Sans MS"/>
-              </a:rPr>
-              <a:t>+y+z</a:t>
+              <a:t>w+x+y+z</a:t>
             </a:r>
             <a:r>
               <a:rPr lang="en-US" sz="3600" dirty="0" smtClean="0">
@@ -3359,17 +3330,7 @@
                 <a:latin typeface="Comic Sans MS"/>
                 <a:cs typeface="Comic Sans MS"/>
               </a:rPr>
-              <a:t>a,b,c,</a:t>
-            </a:r>
-            <a:r>
-              <a:rPr lang="en-US" sz="3600" dirty="0" err="1" smtClean="0">
-                <a:solidFill>
-                  <a:srgbClr val="0000FF"/>
-                </a:solidFill>
-                <a:latin typeface="Comic Sans MS"/>
-                <a:cs typeface="Comic Sans MS"/>
-              </a:rPr>
-              <a:t>d,e</a:t>
+              <a:t>a,b,c,d,e</a:t>
             </a:r>
             <a:r>
               <a:rPr lang="en-US" sz="3600" dirty="0" smtClean="0">
@@ -3407,7 +3368,7 @@
           <a:graphicData uri="http://schemas.openxmlformats.org/presentationml/2006/ole">
             <mc:AlternateContent xmlns:mc="http://schemas.openxmlformats.org/markup-compatibility/2006">
               <mc:Choice xmlns:v="urn:schemas-microsoft-com:vml" Requires="v">
-                <p:oleObj spid="_x0000_s1035" name="Equation" r:id="rId3" imgW="1244600" imgH="533400" progId="Equation.3">
+                <p:oleObj spid="_x0000_s1038" name="Equation" r:id="rId3" imgW="1244600" imgH="533400" progId="Equation.3">
                   <p:embed/>
                 </p:oleObj>
               </mc:Choice>

</xml_diff>